<commit_message>
Todo puesto en el main
falta comprobar que funcione
y si sobra tiempo, mejorar la estructura y tal
</commit_message>
<xml_diff>
--- a/ApuestasJDBC.pptx
+++ b/ApuestasJDBC.pptx
@@ -106,6 +106,11 @@
       </a:defRPr>
     </a:lvl9pPr>
   </p:defaultTextStyle>
+  <p:extLst>
+    <p:ext uri="{EFAFB233-063F-42B5-8137-9DF3F51BA10A}">
+      <p15:sldGuideLst xmlns:p15="http://schemas.microsoft.com/office/powerpoint/2012/main"/>
+    </p:ext>
+  </p:extLst>
 </p:presentation>
 </file>
 
@@ -1321,7 +1326,7 @@
             <a:fld id="{9334D819-9F07-4261-B09B-9E467E5D9002}" type="datetimeFigureOut">
               <a:rPr lang="en-US" dirty="0"/>
               <a:pPr/>
-              <a:t>11/18/2019</a:t>
+              <a:t>12/3/2019</a:t>
             </a:fld>
             <a:endParaRPr lang="en-US" dirty="0"/>
           </a:p>
@@ -1555,7 +1560,7 @@
           <a:p>
             <a:fld id="{9334D819-9F07-4261-B09B-9E467E5D9002}" type="datetimeFigureOut">
               <a:rPr lang="en-US" dirty="0"/>
-              <a:t>11/18/2019</a:t>
+              <a:t>12/3/2019</a:t>
             </a:fld>
             <a:endParaRPr lang="en-US" dirty="0"/>
           </a:p>
@@ -1730,7 +1735,7 @@
           <a:p>
             <a:fld id="{9334D819-9F07-4261-B09B-9E467E5D9002}" type="datetimeFigureOut">
               <a:rPr lang="en-US" dirty="0"/>
-              <a:t>11/18/2019</a:t>
+              <a:t>12/3/2019</a:t>
             </a:fld>
             <a:endParaRPr lang="en-US" dirty="0"/>
           </a:p>
@@ -1895,7 +1900,7 @@
           <a:p>
             <a:fld id="{9334D819-9F07-4261-B09B-9E467E5D9002}" type="datetimeFigureOut">
               <a:rPr lang="en-US" dirty="0"/>
-              <a:t>11/18/2019</a:t>
+              <a:t>12/3/2019</a:t>
             </a:fld>
             <a:endParaRPr lang="en-US" dirty="0"/>
           </a:p>
@@ -2164,7 +2169,7 @@
             <a:fld id="{9334D819-9F07-4261-B09B-9E467E5D9002}" type="datetimeFigureOut">
               <a:rPr lang="en-US" dirty="0"/>
               <a:pPr/>
-              <a:t>11/18/2019</a:t>
+              <a:t>12/3/2019</a:t>
             </a:fld>
             <a:endParaRPr lang="en-US" dirty="0"/>
           </a:p>
@@ -3361,7 +3366,7 @@
           <a:p>
             <a:fld id="{9334D819-9F07-4261-B09B-9E467E5D9002}" type="datetimeFigureOut">
               <a:rPr lang="en-US" dirty="0"/>
-              <a:t>11/18/2019</a:t>
+              <a:t>12/3/2019</a:t>
             </a:fld>
             <a:endParaRPr lang="en-US" dirty="0"/>
           </a:p>
@@ -3746,7 +3751,7 @@
           <a:p>
             <a:fld id="{9334D819-9F07-4261-B09B-9E467E5D9002}" type="datetimeFigureOut">
               <a:rPr lang="en-US" dirty="0"/>
-              <a:t>11/18/2019</a:t>
+              <a:t>12/3/2019</a:t>
             </a:fld>
             <a:endParaRPr lang="en-US" dirty="0"/>
           </a:p>
@@ -3864,7 +3869,7 @@
           <a:p>
             <a:fld id="{9334D819-9F07-4261-B09B-9E467E5D9002}" type="datetimeFigureOut">
               <a:rPr lang="en-US" dirty="0"/>
-              <a:t>11/18/2019</a:t>
+              <a:t>12/3/2019</a:t>
             </a:fld>
             <a:endParaRPr lang="en-US" dirty="0"/>
           </a:p>
@@ -3954,7 +3959,7 @@
           <a:p>
             <a:fld id="{9334D819-9F07-4261-B09B-9E467E5D9002}" type="datetimeFigureOut">
               <a:rPr lang="en-US" dirty="0"/>
-              <a:t>11/18/2019</a:t>
+              <a:t>12/3/2019</a:t>
             </a:fld>
             <a:endParaRPr lang="en-US" dirty="0"/>
           </a:p>
@@ -4712,7 +4717,7 @@
           <a:p>
             <a:fld id="{9334D819-9F07-4261-B09B-9E467E5D9002}" type="datetimeFigureOut">
               <a:rPr lang="en-US" dirty="0"/>
-              <a:t>11/18/2019</a:t>
+              <a:t>12/3/2019</a:t>
             </a:fld>
             <a:endParaRPr lang="en-US" dirty="0"/>
           </a:p>
@@ -5547,7 +5552,7 @@
           <a:p>
             <a:fld id="{9334D819-9F07-4261-B09B-9E467E5D9002}" type="datetimeFigureOut">
               <a:rPr lang="en-US" dirty="0"/>
-              <a:t>11/18/2019</a:t>
+              <a:t>12/3/2019</a:t>
             </a:fld>
             <a:endParaRPr lang="en-US" dirty="0"/>
           </a:p>
@@ -5770,7 +5775,7 @@
             <a:fld id="{9334D819-9F07-4261-B09B-9E467E5D9002}" type="datetimeFigureOut">
               <a:rPr lang="en-US" dirty="0"/>
               <a:pPr/>
-              <a:t>11/18/2019</a:t>
+              <a:t>12/3/2019</a:t>
             </a:fld>
             <a:endParaRPr lang="en-US" dirty="0"/>
           </a:p>
@@ -6883,6 +6888,30 @@
           <a:bodyPr/>
           <a:lstStyle/>
           <a:p>
+            <a:r>
+              <a:rPr lang="es-ES" dirty="0" smtClean="0"/>
+              <a:t>Requisitos del programa</a:t>
+            </a:r>
+          </a:p>
+          <a:p>
+            <a:r>
+              <a:rPr lang="es-ES" dirty="0" smtClean="0"/>
+              <a:t>Funcionalidades</a:t>
+            </a:r>
+          </a:p>
+          <a:p>
+            <a:r>
+              <a:rPr lang="es-ES" dirty="0" smtClean="0"/>
+              <a:t>Estructura del programa (división de paquetes y clases)</a:t>
+            </a:r>
+          </a:p>
+          <a:p>
+            <a:r>
+              <a:rPr lang="es-ES" dirty="0" smtClean="0"/>
+              <a:t>Diagrama de clases</a:t>
+            </a:r>
+          </a:p>
+          <a:p>
             <a:endParaRPr lang="es-ES" dirty="0"/>
           </a:p>
         </p:txBody>

</xml_diff>

<commit_message>
métodos significativos ppt (crear partido, crear usuario y consultar resultado apuesta)
</commit_message>
<xml_diff>
--- a/ApuestasJDBC.pptx
+++ b/ApuestasJDBC.pptx
@@ -1330,7 +1330,7 @@
             <a:fld id="{9334D819-9F07-4261-B09B-9E467E5D9002}" type="datetimeFigureOut">
               <a:rPr lang="en-US" dirty="0"/>
               <a:pPr/>
-              <a:t>12/11/2019</a:t>
+              <a:t>12/15/2019</a:t>
             </a:fld>
             <a:endParaRPr lang="en-US" dirty="0"/>
           </a:p>
@@ -1564,7 +1564,7 @@
           <a:p>
             <a:fld id="{9334D819-9F07-4261-B09B-9E467E5D9002}" type="datetimeFigureOut">
               <a:rPr lang="en-US" dirty="0"/>
-              <a:t>12/11/2019</a:t>
+              <a:t>12/15/2019</a:t>
             </a:fld>
             <a:endParaRPr lang="en-US" dirty="0"/>
           </a:p>
@@ -1739,7 +1739,7 @@
           <a:p>
             <a:fld id="{9334D819-9F07-4261-B09B-9E467E5D9002}" type="datetimeFigureOut">
               <a:rPr lang="en-US" dirty="0"/>
-              <a:t>12/11/2019</a:t>
+              <a:t>12/15/2019</a:t>
             </a:fld>
             <a:endParaRPr lang="en-US" dirty="0"/>
           </a:p>
@@ -1904,7 +1904,7 @@
           <a:p>
             <a:fld id="{9334D819-9F07-4261-B09B-9E467E5D9002}" type="datetimeFigureOut">
               <a:rPr lang="en-US" dirty="0"/>
-              <a:t>12/11/2019</a:t>
+              <a:t>12/15/2019</a:t>
             </a:fld>
             <a:endParaRPr lang="en-US" dirty="0"/>
           </a:p>
@@ -2173,7 +2173,7 @@
             <a:fld id="{9334D819-9F07-4261-B09B-9E467E5D9002}" type="datetimeFigureOut">
               <a:rPr lang="en-US" dirty="0"/>
               <a:pPr/>
-              <a:t>12/11/2019</a:t>
+              <a:t>12/15/2019</a:t>
             </a:fld>
             <a:endParaRPr lang="en-US" dirty="0"/>
           </a:p>
@@ -3370,7 +3370,7 @@
           <a:p>
             <a:fld id="{9334D819-9F07-4261-B09B-9E467E5D9002}" type="datetimeFigureOut">
               <a:rPr lang="en-US" dirty="0"/>
-              <a:t>12/11/2019</a:t>
+              <a:t>12/15/2019</a:t>
             </a:fld>
             <a:endParaRPr lang="en-US" dirty="0"/>
           </a:p>
@@ -3755,7 +3755,7 @@
           <a:p>
             <a:fld id="{9334D819-9F07-4261-B09B-9E467E5D9002}" type="datetimeFigureOut">
               <a:rPr lang="en-US" dirty="0"/>
-              <a:t>12/11/2019</a:t>
+              <a:t>12/15/2019</a:t>
             </a:fld>
             <a:endParaRPr lang="en-US" dirty="0"/>
           </a:p>
@@ -3873,7 +3873,7 @@
           <a:p>
             <a:fld id="{9334D819-9F07-4261-B09B-9E467E5D9002}" type="datetimeFigureOut">
               <a:rPr lang="en-US" dirty="0"/>
-              <a:t>12/11/2019</a:t>
+              <a:t>12/15/2019</a:t>
             </a:fld>
             <a:endParaRPr lang="en-US" dirty="0"/>
           </a:p>
@@ -3963,7 +3963,7 @@
           <a:p>
             <a:fld id="{9334D819-9F07-4261-B09B-9E467E5D9002}" type="datetimeFigureOut">
               <a:rPr lang="en-US" dirty="0"/>
-              <a:t>12/11/2019</a:t>
+              <a:t>12/15/2019</a:t>
             </a:fld>
             <a:endParaRPr lang="en-US" dirty="0"/>
           </a:p>
@@ -4721,7 +4721,7 @@
           <a:p>
             <a:fld id="{9334D819-9F07-4261-B09B-9E467E5D9002}" type="datetimeFigureOut">
               <a:rPr lang="en-US" dirty="0"/>
-              <a:t>12/11/2019</a:t>
+              <a:t>12/15/2019</a:t>
             </a:fld>
             <a:endParaRPr lang="en-US" dirty="0"/>
           </a:p>
@@ -5556,7 +5556,7 @@
           <a:p>
             <a:fld id="{9334D819-9F07-4261-B09B-9E467E5D9002}" type="datetimeFigureOut">
               <a:rPr lang="en-US" dirty="0"/>
-              <a:t>12/11/2019</a:t>
+              <a:t>12/15/2019</a:t>
             </a:fld>
             <a:endParaRPr lang="en-US" dirty="0"/>
           </a:p>
@@ -5779,7 +5779,7 @@
             <a:fld id="{9334D819-9F07-4261-B09B-9E467E5D9002}" type="datetimeFigureOut">
               <a:rPr lang="en-US" dirty="0"/>
               <a:pPr/>
-              <a:t>12/11/2019</a:t>
+              <a:t>12/15/2019</a:t>
             </a:fld>
             <a:endParaRPr lang="en-US" dirty="0"/>
           </a:p>
@@ -6896,16 +6896,11 @@
               <a:rPr lang="es-ES" dirty="0" smtClean="0"/>
               <a:t>Funcionalidades</a:t>
             </a:r>
-            <a:endParaRPr lang="es-ES" dirty="0" smtClean="0"/>
           </a:p>
           <a:p>
             <a:r>
               <a:rPr lang="es-ES" dirty="0" smtClean="0"/>
-              <a:t>Estructura del programa (división de paquetes y clases</a:t>
-            </a:r>
-            <a:r>
-              <a:rPr lang="es-ES" dirty="0" smtClean="0"/>
-              <a:t>)</a:t>
+              <a:t>Estructura del programa (división de paquetes y clases)</a:t>
             </a:r>
           </a:p>
           <a:p>
@@ -6919,7 +6914,6 @@
               <a:rPr lang="es-ES" dirty="0" smtClean="0"/>
               <a:t>Dificultades</a:t>
             </a:r>
-            <a:endParaRPr lang="es-ES" dirty="0" smtClean="0"/>
           </a:p>
         </p:txBody>
       </p:sp>
@@ -7271,7 +7265,222 @@
           <a:bodyPr/>
           <a:lstStyle/>
           <a:p>
-            <a:endParaRPr lang="es-ES"/>
+            <a:pPr marL="0" indent="0">
+              <a:buNone/>
+            </a:pPr>
+            <a:r>
+              <a:rPr lang="es-ES" dirty="0" smtClean="0"/>
+              <a:t>Comprobar resultado apuesta anterior:</a:t>
+            </a:r>
+          </a:p>
+          <a:p>
+            <a:r>
+              <a:rPr lang="es-ES" sz="1800" dirty="0" err="1" smtClean="0"/>
+              <a:t>public</a:t>
+            </a:r>
+            <a:r>
+              <a:rPr lang="es-ES" sz="1800" dirty="0" smtClean="0"/>
+              <a:t> </a:t>
+            </a:r>
+            <a:r>
+              <a:rPr lang="es-ES" sz="1800" dirty="0" err="1"/>
+              <a:t>ArrayList</a:t>
+            </a:r>
+            <a:r>
+              <a:rPr lang="es-ES" sz="1800" dirty="0"/>
+              <a:t>&lt;Apuesta&gt; </a:t>
+            </a:r>
+            <a:r>
+              <a:rPr lang="es-ES" sz="1800" dirty="0" err="1"/>
+              <a:t>validarListaApuestasPorFecha</a:t>
+            </a:r>
+            <a:r>
+              <a:rPr lang="es-ES" sz="1800" dirty="0"/>
+              <a:t>(</a:t>
+            </a:r>
+            <a:r>
+              <a:rPr lang="es-ES" sz="1800" dirty="0" err="1"/>
+              <a:t>UsuarioImpl</a:t>
+            </a:r>
+            <a:r>
+              <a:rPr lang="es-ES" sz="1800" dirty="0"/>
+              <a:t> </a:t>
+            </a:r>
+            <a:r>
+              <a:rPr lang="es-ES" sz="1800" dirty="0" err="1"/>
+              <a:t>usuarioApuesta</a:t>
+            </a:r>
+            <a:r>
+              <a:rPr lang="es-ES" sz="1800" dirty="0"/>
+              <a:t>, </a:t>
+            </a:r>
+            <a:r>
+              <a:rPr lang="es-ES" sz="1800" dirty="0" err="1"/>
+              <a:t>GregorianCalendar</a:t>
+            </a:r>
+            <a:r>
+              <a:rPr lang="es-ES" sz="1800" dirty="0"/>
+              <a:t> </a:t>
+            </a:r>
+            <a:r>
+              <a:rPr lang="es-ES" sz="1800" dirty="0" err="1"/>
+              <a:t>fechaApuesta</a:t>
+            </a:r>
+            <a:r>
+              <a:rPr lang="es-ES" sz="1800" dirty="0"/>
+              <a:t>)</a:t>
+            </a:r>
+          </a:p>
+          <a:p>
+            <a:r>
+              <a:rPr lang="es-ES" sz="1800" dirty="0" err="1" smtClean="0"/>
+              <a:t>public</a:t>
+            </a:r>
+            <a:r>
+              <a:rPr lang="es-ES" sz="1800" dirty="0" smtClean="0"/>
+              <a:t> </a:t>
+            </a:r>
+            <a:r>
+              <a:rPr lang="es-ES" sz="1800" dirty="0" err="1"/>
+              <a:t>void</a:t>
+            </a:r>
+            <a:r>
+              <a:rPr lang="es-ES" sz="1800" dirty="0"/>
+              <a:t> </a:t>
+            </a:r>
+            <a:r>
+              <a:rPr lang="es-ES" sz="1800" dirty="0" err="1"/>
+              <a:t>verResultadoApuesta</a:t>
+            </a:r>
+            <a:r>
+              <a:rPr lang="es-ES" sz="1800" dirty="0"/>
+              <a:t>(</a:t>
+            </a:r>
+            <a:r>
+              <a:rPr lang="es-ES" sz="1800" dirty="0" err="1"/>
+              <a:t>ArrayList</a:t>
+            </a:r>
+            <a:r>
+              <a:rPr lang="es-ES" sz="1800" dirty="0"/>
+              <a:t>&lt;Apuesta&gt; </a:t>
+            </a:r>
+            <a:r>
+              <a:rPr lang="es-ES" sz="1800" dirty="0" err="1"/>
+              <a:t>listaApuestas</a:t>
+            </a:r>
+            <a:r>
+              <a:rPr lang="es-ES" sz="1800" dirty="0" smtClean="0"/>
+              <a:t>)</a:t>
+            </a:r>
+          </a:p>
+          <a:p>
+            <a:pPr marL="0" indent="0">
+              <a:buNone/>
+            </a:pPr>
+            <a:r>
+              <a:rPr lang="es-ES" dirty="0" smtClean="0"/>
+              <a:t>Crear nuevo usuario:</a:t>
+            </a:r>
+          </a:p>
+          <a:p>
+            <a:r>
+              <a:rPr lang="es-ES" sz="1800" dirty="0" err="1"/>
+              <a:t>public</a:t>
+            </a:r>
+            <a:r>
+              <a:rPr lang="es-ES" sz="1800" dirty="0"/>
+              <a:t> </a:t>
+            </a:r>
+            <a:r>
+              <a:rPr lang="es-ES" sz="1800" dirty="0" err="1"/>
+              <a:t>boolean</a:t>
+            </a:r>
+            <a:r>
+              <a:rPr lang="es-ES" sz="1800" dirty="0"/>
+              <a:t> </a:t>
+            </a:r>
+            <a:r>
+              <a:rPr lang="es-ES" sz="1800" dirty="0" err="1"/>
+              <a:t>insertarUsuario</a:t>
+            </a:r>
+            <a:r>
+              <a:rPr lang="es-ES" sz="1800" dirty="0"/>
+              <a:t>(</a:t>
+            </a:r>
+            <a:r>
+              <a:rPr lang="es-ES" sz="1800" dirty="0" err="1"/>
+              <a:t>UsuarioImpl</a:t>
+            </a:r>
+            <a:r>
+              <a:rPr lang="es-ES" sz="1800" dirty="0"/>
+              <a:t> </a:t>
+            </a:r>
+            <a:r>
+              <a:rPr lang="es-ES" sz="1800" dirty="0" err="1"/>
+              <a:t>nuevoUsuario</a:t>
+            </a:r>
+            <a:r>
+              <a:rPr lang="es-ES" sz="1800" dirty="0" smtClean="0"/>
+              <a:t>)</a:t>
+            </a:r>
+          </a:p>
+          <a:p>
+            <a:pPr marL="0" indent="0">
+              <a:buNone/>
+            </a:pPr>
+            <a:r>
+              <a:rPr lang="es-ES" dirty="0" smtClean="0"/>
+              <a:t>Crear nuevo partido:</a:t>
+            </a:r>
+          </a:p>
+          <a:p>
+            <a:r>
+              <a:rPr lang="es-ES" sz="1800" dirty="0" err="1"/>
+              <a:t>public</a:t>
+            </a:r>
+            <a:r>
+              <a:rPr lang="es-ES" sz="1800" dirty="0"/>
+              <a:t> </a:t>
+            </a:r>
+            <a:r>
+              <a:rPr lang="es-ES" sz="1800" dirty="0" err="1"/>
+              <a:t>boolean</a:t>
+            </a:r>
+            <a:r>
+              <a:rPr lang="es-ES" sz="1800" dirty="0"/>
+              <a:t> </a:t>
+            </a:r>
+            <a:r>
+              <a:rPr lang="es-ES" sz="1800" dirty="0" err="1"/>
+              <a:t>insertarPartido</a:t>
+            </a:r>
+            <a:r>
+              <a:rPr lang="es-ES" sz="1800" dirty="0"/>
+              <a:t>(</a:t>
+            </a:r>
+            <a:r>
+              <a:rPr lang="es-ES" sz="1800" dirty="0" err="1"/>
+              <a:t>PartidoImpl</a:t>
+            </a:r>
+            <a:r>
+              <a:rPr lang="es-ES" sz="1800" dirty="0"/>
+              <a:t> </a:t>
+            </a:r>
+            <a:r>
+              <a:rPr lang="es-ES" sz="1800" dirty="0" err="1"/>
+              <a:t>partidoNuevo</a:t>
+            </a:r>
+            <a:r>
+              <a:rPr lang="es-ES" sz="1800" dirty="0"/>
+              <a:t>)</a:t>
+            </a:r>
+            <a:endParaRPr lang="es-ES" sz="1800" dirty="0" smtClean="0"/>
+          </a:p>
+          <a:p>
+            <a:endParaRPr lang="es-ES" dirty="0" smtClean="0"/>
+          </a:p>
+          <a:p>
+            <a:endParaRPr lang="es-ES" dirty="0"/>
           </a:p>
         </p:txBody>
       </p:sp>

</xml_diff>

<commit_message>
PowerPoint con métodos más significativos
</commit_message>
<xml_diff>
--- a/ApuestasJDBC.pptx
+++ b/ApuestasJDBC.pptx
@@ -10,8 +10,10 @@
     <p:sldId id="259" r:id="rId4"/>
     <p:sldId id="260" r:id="rId5"/>
     <p:sldId id="261" r:id="rId6"/>
-    <p:sldId id="262" r:id="rId7"/>
-    <p:sldId id="257" r:id="rId8"/>
+    <p:sldId id="263" r:id="rId7"/>
+    <p:sldId id="264" r:id="rId8"/>
+    <p:sldId id="262" r:id="rId9"/>
+    <p:sldId id="257" r:id="rId10"/>
   </p:sldIdLst>
   <p:sldSz cx="12192000" cy="6858000"/>
   <p:notesSz cx="6858000" cy="9144000"/>
@@ -1330,7 +1332,7 @@
             <a:fld id="{9334D819-9F07-4261-B09B-9E467E5D9002}" type="datetimeFigureOut">
               <a:rPr lang="en-US" dirty="0"/>
               <a:pPr/>
-              <a:t>12/15/2019</a:t>
+              <a:t>12/16/2019</a:t>
             </a:fld>
             <a:endParaRPr lang="en-US" dirty="0"/>
           </a:p>
@@ -1564,7 +1566,7 @@
           <a:p>
             <a:fld id="{9334D819-9F07-4261-B09B-9E467E5D9002}" type="datetimeFigureOut">
               <a:rPr lang="en-US" dirty="0"/>
-              <a:t>12/15/2019</a:t>
+              <a:t>12/16/2019</a:t>
             </a:fld>
             <a:endParaRPr lang="en-US" dirty="0"/>
           </a:p>
@@ -1739,7 +1741,7 @@
           <a:p>
             <a:fld id="{9334D819-9F07-4261-B09B-9E467E5D9002}" type="datetimeFigureOut">
               <a:rPr lang="en-US" dirty="0"/>
-              <a:t>12/15/2019</a:t>
+              <a:t>12/16/2019</a:t>
             </a:fld>
             <a:endParaRPr lang="en-US" dirty="0"/>
           </a:p>
@@ -1904,7 +1906,7 @@
           <a:p>
             <a:fld id="{9334D819-9F07-4261-B09B-9E467E5D9002}" type="datetimeFigureOut">
               <a:rPr lang="en-US" dirty="0"/>
-              <a:t>12/15/2019</a:t>
+              <a:t>12/16/2019</a:t>
             </a:fld>
             <a:endParaRPr lang="en-US" dirty="0"/>
           </a:p>
@@ -2173,7 +2175,7 @@
             <a:fld id="{9334D819-9F07-4261-B09B-9E467E5D9002}" type="datetimeFigureOut">
               <a:rPr lang="en-US" dirty="0"/>
               <a:pPr/>
-              <a:t>12/15/2019</a:t>
+              <a:t>12/16/2019</a:t>
             </a:fld>
             <a:endParaRPr lang="en-US" dirty="0"/>
           </a:p>
@@ -3370,7 +3372,7 @@
           <a:p>
             <a:fld id="{9334D819-9F07-4261-B09B-9E467E5D9002}" type="datetimeFigureOut">
               <a:rPr lang="en-US" dirty="0"/>
-              <a:t>12/15/2019</a:t>
+              <a:t>12/16/2019</a:t>
             </a:fld>
             <a:endParaRPr lang="en-US" dirty="0"/>
           </a:p>
@@ -3755,7 +3757,7 @@
           <a:p>
             <a:fld id="{9334D819-9F07-4261-B09B-9E467E5D9002}" type="datetimeFigureOut">
               <a:rPr lang="en-US" dirty="0"/>
-              <a:t>12/15/2019</a:t>
+              <a:t>12/16/2019</a:t>
             </a:fld>
             <a:endParaRPr lang="en-US" dirty="0"/>
           </a:p>
@@ -3873,7 +3875,7 @@
           <a:p>
             <a:fld id="{9334D819-9F07-4261-B09B-9E467E5D9002}" type="datetimeFigureOut">
               <a:rPr lang="en-US" dirty="0"/>
-              <a:t>12/15/2019</a:t>
+              <a:t>12/16/2019</a:t>
             </a:fld>
             <a:endParaRPr lang="en-US" dirty="0"/>
           </a:p>
@@ -3963,7 +3965,7 @@
           <a:p>
             <a:fld id="{9334D819-9F07-4261-B09B-9E467E5D9002}" type="datetimeFigureOut">
               <a:rPr lang="en-US" dirty="0"/>
-              <a:t>12/15/2019</a:t>
+              <a:t>12/16/2019</a:t>
             </a:fld>
             <a:endParaRPr lang="en-US" dirty="0"/>
           </a:p>
@@ -4721,7 +4723,7 @@
           <a:p>
             <a:fld id="{9334D819-9F07-4261-B09B-9E467E5D9002}" type="datetimeFigureOut">
               <a:rPr lang="en-US" dirty="0"/>
-              <a:t>12/15/2019</a:t>
+              <a:t>12/16/2019</a:t>
             </a:fld>
             <a:endParaRPr lang="en-US" dirty="0"/>
           </a:p>
@@ -5556,7 +5558,7 @@
           <a:p>
             <a:fld id="{9334D819-9F07-4261-B09B-9E467E5D9002}" type="datetimeFigureOut">
               <a:rPr lang="en-US" dirty="0"/>
-              <a:t>12/15/2019</a:t>
+              <a:t>12/16/2019</a:t>
             </a:fld>
             <a:endParaRPr lang="en-US" dirty="0"/>
           </a:p>
@@ -5779,7 +5781,7 @@
             <a:fld id="{9334D819-9F07-4261-B09B-9E467E5D9002}" type="datetimeFigureOut">
               <a:rPr lang="en-US" dirty="0"/>
               <a:pPr/>
-              <a:t>12/15/2019</a:t>
+              <a:t>12/16/2019</a:t>
             </a:fld>
             <a:endParaRPr lang="en-US" dirty="0"/>
           </a:p>
@@ -7260,7 +7262,12 @@
             <p:ph idx="1"/>
           </p:nvPr>
         </p:nvSpPr>
-        <p:spPr/>
+        <p:spPr>
+          <a:xfrm>
+            <a:off x="1251678" y="1751163"/>
+            <a:ext cx="10178322" cy="4615132"/>
+          </a:xfrm>
+        </p:spPr>
         <p:txBody>
           <a:bodyPr/>
           <a:lstStyle/>
@@ -7269,159 +7276,91 @@
               <a:buNone/>
             </a:pPr>
             <a:r>
+              <a:rPr lang="es-ES" dirty="0"/>
+              <a:t>Realizar una </a:t>
+            </a:r>
+            <a:r>
               <a:rPr lang="es-ES" dirty="0" smtClean="0"/>
-              <a:t>Comprobar resultado apuesta anterior:</a:t>
-            </a:r>
-          </a:p>
-          <a:p>
-            <a:r>
-              <a:rPr lang="es-ES" sz="1800" dirty="0" err="1" smtClean="0"/>
+              <a:t>apuesta</a:t>
+            </a:r>
+            <a:r>
+              <a:rPr lang="es-ES" dirty="0" smtClean="0"/>
+              <a:t>:</a:t>
+            </a:r>
+          </a:p>
+          <a:p>
+            <a:r>
+              <a:rPr lang="es-ES" dirty="0" err="1"/>
               <a:t>public</a:t>
             </a:r>
             <a:r>
-              <a:rPr lang="es-ES" sz="1800" dirty="0" smtClean="0"/>
+              <a:rPr lang="es-ES" dirty="0"/>
               <a:t> </a:t>
             </a:r>
             <a:r>
-              <a:rPr lang="es-ES" sz="1800" dirty="0" err="1"/>
-              <a:t>ArrayList</a:t>
-            </a:r>
-            <a:r>
-              <a:rPr lang="es-ES" sz="1800" dirty="0"/>
-              <a:t>&lt;Apuesta&gt; </a:t>
-            </a:r>
-            <a:r>
-              <a:rPr lang="es-ES" sz="1800" dirty="0" err="1"/>
-              <a:t>validarListaApuestasPorFecha</a:t>
-            </a:r>
-            <a:r>
-              <a:rPr lang="es-ES" sz="1800" dirty="0"/>
-              <a:t>(</a:t>
-            </a:r>
-            <a:r>
-              <a:rPr lang="es-ES" sz="1800" dirty="0" err="1"/>
-              <a:t>UsuarioImpl</a:t>
-            </a:r>
-            <a:r>
-              <a:rPr lang="es-ES" sz="1800" dirty="0"/>
+              <a:rPr lang="es-ES" dirty="0" err="1"/>
+              <a:t>boolean</a:t>
+            </a:r>
+            <a:r>
+              <a:rPr lang="es-ES" dirty="0"/>
               <a:t> </a:t>
             </a:r>
             <a:r>
-              <a:rPr lang="es-ES" sz="1800" dirty="0" err="1"/>
-              <a:t>usuarioApuesta</a:t>
-            </a:r>
-            <a:r>
-              <a:rPr lang="es-ES" sz="1800" dirty="0"/>
-              <a:t>, </a:t>
-            </a:r>
-            <a:r>
-              <a:rPr lang="es-ES" sz="1800" dirty="0" err="1"/>
-              <a:t>GregorianCalendar</a:t>
-            </a:r>
-            <a:r>
-              <a:rPr lang="es-ES" sz="1800" dirty="0"/>
-              <a:t> </a:t>
-            </a:r>
-            <a:r>
-              <a:rPr lang="es-ES" sz="1800" dirty="0" err="1"/>
-              <a:t>fechaApuesta</a:t>
-            </a:r>
-            <a:r>
-              <a:rPr lang="es-ES" sz="1800" dirty="0"/>
-              <a:t>)</a:t>
-            </a:r>
-          </a:p>
-          <a:p>
-            <a:r>
-              <a:rPr lang="es-ES" sz="1800" dirty="0" err="1" smtClean="0"/>
-              <a:t>public</a:t>
-            </a:r>
-            <a:r>
-              <a:rPr lang="es-ES" sz="1800" dirty="0" smtClean="0"/>
-              <a:t> </a:t>
-            </a:r>
-            <a:r>
-              <a:rPr lang="es-ES" sz="1800" dirty="0" err="1"/>
-              <a:t>void</a:t>
-            </a:r>
-            <a:r>
-              <a:rPr lang="es-ES" sz="1800" dirty="0"/>
-              <a:t> </a:t>
-            </a:r>
-            <a:r>
-              <a:rPr lang="es-ES" sz="1800" dirty="0" err="1"/>
-              <a:t>verResultadoApuesta</a:t>
-            </a:r>
-            <a:r>
-              <a:rPr lang="es-ES" sz="1800" dirty="0"/>
-              <a:t>(</a:t>
-            </a:r>
-            <a:r>
-              <a:rPr lang="es-ES" sz="1800" dirty="0" err="1"/>
-              <a:t>ArrayList</a:t>
-            </a:r>
-            <a:r>
-              <a:rPr lang="es-ES" sz="1800" dirty="0"/>
-              <a:t>&lt;Apuesta&gt; </a:t>
-            </a:r>
-            <a:r>
-              <a:rPr lang="es-ES" sz="1800" dirty="0" err="1"/>
-              <a:t>listaApuestas</a:t>
-            </a:r>
-            <a:r>
-              <a:rPr lang="es-ES" sz="1800" dirty="0" smtClean="0"/>
-              <a:t>)</a:t>
-            </a:r>
+              <a:rPr lang="es-ES" dirty="0" err="1"/>
+              <a:t>realizarApuesta</a:t>
+            </a:r>
+            <a:r>
+              <a:rPr lang="es-ES" dirty="0"/>
+              <a:t>(Apuesta apuesta)</a:t>
+            </a:r>
+            <a:endParaRPr lang="es-ES" dirty="0" smtClean="0"/>
           </a:p>
           <a:p>
             <a:pPr marL="0" indent="0">
               <a:buNone/>
             </a:pPr>
             <a:r>
+              <a:rPr lang="es-ES" dirty="0"/>
+              <a:t>Ver los partidos disponibles para </a:t>
+            </a:r>
+            <a:r>
               <a:rPr lang="es-ES" dirty="0" smtClean="0"/>
-              <a:t>Crear nuevo usuario:</a:t>
-            </a:r>
-          </a:p>
-          <a:p>
-            <a:r>
-              <a:rPr lang="es-ES" sz="1800" dirty="0" err="1"/>
+              <a:t>apostar:</a:t>
+            </a:r>
+            <a:endParaRPr lang="es-ES" dirty="0"/>
+          </a:p>
+          <a:p>
+            <a:r>
+              <a:rPr lang="es-ES" dirty="0" err="1"/>
               <a:t>public</a:t>
             </a:r>
             <a:r>
-              <a:rPr lang="es-ES" sz="1800" dirty="0"/>
+              <a:rPr lang="es-ES" dirty="0"/>
               <a:t> </a:t>
             </a:r>
             <a:r>
-              <a:rPr lang="es-ES" sz="1800" dirty="0" err="1"/>
-              <a:t>boolean</a:t>
-            </a:r>
-            <a:r>
-              <a:rPr lang="es-ES" sz="1800" dirty="0"/>
-              <a:t> </a:t>
-            </a:r>
-            <a:r>
-              <a:rPr lang="es-ES" sz="1800" dirty="0" err="1"/>
-              <a:t>insertarUsuario</a:t>
-            </a:r>
-            <a:r>
-              <a:rPr lang="es-ES" sz="1800" dirty="0"/>
-              <a:t>(</a:t>
-            </a:r>
-            <a:r>
-              <a:rPr lang="es-ES" sz="1800" dirty="0" err="1"/>
-              <a:t>UsuarioImpl</a:t>
-            </a:r>
-            <a:r>
-              <a:rPr lang="es-ES" sz="1800" dirty="0"/>
-              <a:t> </a:t>
-            </a:r>
-            <a:r>
-              <a:rPr lang="es-ES" sz="1800" dirty="0" err="1"/>
-              <a:t>nuevoUsuario</a:t>
-            </a:r>
-            <a:r>
-              <a:rPr lang="es-ES" sz="1800" dirty="0" smtClean="0"/>
-              <a:t>)</a:t>
+              <a:rPr lang="es-ES" dirty="0" err="1"/>
+              <a:t>ArrayList</a:t>
+            </a:r>
+            <a:r>
+              <a:rPr lang="es-ES" dirty="0"/>
+              <a:t>&lt;</a:t>
+            </a:r>
+            <a:r>
+              <a:rPr lang="es-ES" dirty="0" err="1"/>
+              <a:t>PartidoImpl</a:t>
+            </a:r>
+            <a:r>
+              <a:rPr lang="es-ES" dirty="0"/>
+              <a:t>&gt; </a:t>
+            </a:r>
+            <a:r>
+              <a:rPr lang="es-ES" dirty="0" err="1"/>
+              <a:t>VerPartidosDisponibles</a:t>
+            </a:r>
+            <a:r>
+              <a:rPr lang="es-ES" dirty="0" smtClean="0"/>
+              <a:t>()</a:t>
             </a:r>
           </a:p>
           <a:p>
@@ -7429,52 +7368,166 @@
               <a:buNone/>
             </a:pPr>
             <a:r>
+              <a:rPr lang="es-ES" dirty="0"/>
+              <a:t>Comprobar resultado apuesta anterior:</a:t>
+            </a:r>
+          </a:p>
+          <a:p>
+            <a:r>
+              <a:rPr lang="es-ES" dirty="0" err="1"/>
+              <a:t>public</a:t>
+            </a:r>
+            <a:r>
+              <a:rPr lang="es-ES" dirty="0"/>
+              <a:t> </a:t>
+            </a:r>
+            <a:r>
+              <a:rPr lang="es-ES" dirty="0" err="1"/>
+              <a:t>ArrayList</a:t>
+            </a:r>
+            <a:r>
+              <a:rPr lang="es-ES" dirty="0"/>
+              <a:t>&lt;Apuesta&gt; </a:t>
+            </a:r>
+            <a:r>
+              <a:rPr lang="es-ES" dirty="0" err="1"/>
+              <a:t>validarListaApuestasPorFecha</a:t>
+            </a:r>
+            <a:r>
+              <a:rPr lang="es-ES" dirty="0"/>
+              <a:t>(</a:t>
+            </a:r>
+            <a:r>
+              <a:rPr lang="es-ES" dirty="0" err="1"/>
+              <a:t>UsuarioImpl</a:t>
+            </a:r>
+            <a:r>
+              <a:rPr lang="es-ES" dirty="0"/>
+              <a:t> </a:t>
+            </a:r>
+            <a:r>
+              <a:rPr lang="es-ES" dirty="0" err="1"/>
+              <a:t>usuarioApuesta</a:t>
+            </a:r>
+            <a:r>
+              <a:rPr lang="es-ES" dirty="0"/>
+              <a:t>, </a:t>
+            </a:r>
+            <a:r>
+              <a:rPr lang="es-ES" dirty="0" err="1"/>
+              <a:t>GregorianCalendar</a:t>
+            </a:r>
+            <a:r>
+              <a:rPr lang="es-ES" dirty="0"/>
+              <a:t> </a:t>
+            </a:r>
+            <a:r>
+              <a:rPr lang="es-ES" dirty="0" err="1"/>
+              <a:t>fechaApuesta</a:t>
+            </a:r>
+            <a:r>
+              <a:rPr lang="es-ES" dirty="0"/>
+              <a:t>)</a:t>
+            </a:r>
+          </a:p>
+          <a:p>
+            <a:r>
+              <a:rPr lang="es-ES" dirty="0" err="1"/>
+              <a:t>public</a:t>
+            </a:r>
+            <a:r>
+              <a:rPr lang="es-ES" dirty="0"/>
+              <a:t> </a:t>
+            </a:r>
+            <a:r>
+              <a:rPr lang="es-ES" dirty="0" err="1"/>
+              <a:t>void</a:t>
+            </a:r>
+            <a:r>
+              <a:rPr lang="es-ES" dirty="0"/>
+              <a:t> </a:t>
+            </a:r>
+            <a:r>
+              <a:rPr lang="es-ES" dirty="0" err="1"/>
+              <a:t>verResultadoApuesta</a:t>
+            </a:r>
+            <a:r>
+              <a:rPr lang="es-ES" dirty="0"/>
+              <a:t>(</a:t>
+            </a:r>
+            <a:r>
+              <a:rPr lang="es-ES" dirty="0" err="1"/>
+              <a:t>ArrayList</a:t>
+            </a:r>
+            <a:r>
+              <a:rPr lang="es-ES" dirty="0"/>
+              <a:t>&lt;Apuesta&gt; </a:t>
+            </a:r>
+            <a:r>
+              <a:rPr lang="es-ES" dirty="0" err="1"/>
+              <a:t>listaApuestas</a:t>
+            </a:r>
+            <a:r>
               <a:rPr lang="es-ES" dirty="0" smtClean="0"/>
-              <a:t>Crear nuevo partido:</a:t>
-            </a:r>
-          </a:p>
-          <a:p>
-            <a:r>
-              <a:rPr lang="es-ES" sz="1800" dirty="0" err="1"/>
+              <a:t>)</a:t>
+            </a:r>
+          </a:p>
+          <a:p>
+            <a:pPr marL="0" indent="0">
+              <a:buNone/>
+            </a:pPr>
+            <a:r>
+              <a:rPr lang="es-ES" dirty="0"/>
+              <a:t>Hacer un ingreso en la cuenta:</a:t>
+            </a:r>
+          </a:p>
+          <a:p>
+            <a:r>
+              <a:rPr lang="es-ES" dirty="0" err="1"/>
               <a:t>public</a:t>
             </a:r>
             <a:r>
-              <a:rPr lang="es-ES" sz="1800" dirty="0"/>
+              <a:rPr lang="es-ES" dirty="0"/>
               <a:t> </a:t>
             </a:r>
             <a:r>
-              <a:rPr lang="es-ES" sz="1800" dirty="0" err="1"/>
+              <a:rPr lang="es-ES" dirty="0" err="1"/>
               <a:t>boolean</a:t>
             </a:r>
             <a:r>
-              <a:rPr lang="es-ES" sz="1800" dirty="0"/>
+              <a:rPr lang="es-ES" dirty="0"/>
               <a:t> </a:t>
             </a:r>
             <a:r>
-              <a:rPr lang="es-ES" sz="1800" dirty="0" err="1"/>
-              <a:t>insertarPartido</a:t>
-            </a:r>
-            <a:r>
-              <a:rPr lang="es-ES" sz="1800" dirty="0"/>
+              <a:rPr lang="es-ES" dirty="0" err="1"/>
+              <a:t>realizarIngresoEnCuentaUsuario</a:t>
+            </a:r>
+            <a:r>
+              <a:rPr lang="es-ES" dirty="0"/>
               <a:t>(</a:t>
             </a:r>
             <a:r>
-              <a:rPr lang="es-ES" sz="1800" dirty="0" err="1"/>
-              <a:t>PartidoImpl</a:t>
-            </a:r>
-            <a:r>
-              <a:rPr lang="es-ES" sz="1800" dirty="0"/>
-              <a:t> </a:t>
-            </a:r>
-            <a:r>
-              <a:rPr lang="es-ES" sz="1800" dirty="0" err="1"/>
-              <a:t>partidoNuevo</a:t>
-            </a:r>
-            <a:r>
-              <a:rPr lang="es-ES" sz="1800" dirty="0"/>
-              <a:t>)</a:t>
-            </a:r>
-            <a:endParaRPr lang="es-ES" sz="1800" dirty="0" smtClean="0"/>
+              <a:rPr lang="es-ES" dirty="0" err="1"/>
+              <a:t>UsuarioImpl</a:t>
+            </a:r>
+            <a:r>
+              <a:rPr lang="es-ES" dirty="0"/>
+              <a:t> usuario, </a:t>
+            </a:r>
+            <a:r>
+              <a:rPr lang="es-ES" dirty="0" err="1"/>
+              <a:t>IngresoImpl</a:t>
+            </a:r>
+            <a:r>
+              <a:rPr lang="es-ES" dirty="0"/>
+              <a:t> ingreso)</a:t>
+            </a:r>
+          </a:p>
+          <a:p>
+            <a:endParaRPr lang="es-ES" dirty="0"/>
+          </a:p>
+          <a:p>
+            <a:endParaRPr lang="es-ES" dirty="0"/>
           </a:p>
           <a:p>
             <a:endParaRPr lang="es-ES" dirty="0" smtClean="0"/>
@@ -7531,6 +7584,530 @@
           <a:p>
             <a:r>
               <a:rPr lang="es-ES" dirty="0" smtClean="0"/>
+              <a:t>Métodos significativos</a:t>
+            </a:r>
+            <a:endParaRPr lang="es-ES" dirty="0"/>
+          </a:p>
+        </p:txBody>
+      </p:sp>
+      <p:sp>
+        <p:nvSpPr>
+          <p:cNvPr id="3" name="Marcador de contenido 2"/>
+          <p:cNvSpPr>
+            <a:spLocks noGrp="1"/>
+          </p:cNvSpPr>
+          <p:nvPr>
+            <p:ph idx="1"/>
+          </p:nvPr>
+        </p:nvSpPr>
+        <p:spPr>
+          <a:xfrm>
+            <a:off x="1251678" y="1958195"/>
+            <a:ext cx="10178322" cy="4330461"/>
+          </a:xfrm>
+        </p:spPr>
+        <p:txBody>
+          <a:bodyPr>
+            <a:normAutofit/>
+          </a:bodyPr>
+          <a:lstStyle/>
+          <a:p>
+            <a:pPr marL="0" indent="0">
+              <a:buNone/>
+            </a:pPr>
+            <a:r>
+              <a:rPr lang="es-ES" dirty="0" smtClean="0"/>
+              <a:t>Hacer </a:t>
+            </a:r>
+            <a:r>
+              <a:rPr lang="es-ES" dirty="0"/>
+              <a:t>una retirada de la </a:t>
+            </a:r>
+            <a:r>
+              <a:rPr lang="es-ES" dirty="0" smtClean="0"/>
+              <a:t>cuenta:</a:t>
+            </a:r>
+            <a:endParaRPr lang="es-ES" dirty="0"/>
+          </a:p>
+          <a:p>
+            <a:r>
+              <a:rPr lang="es-ES" dirty="0" err="1"/>
+              <a:t>public</a:t>
+            </a:r>
+            <a:r>
+              <a:rPr lang="es-ES" dirty="0"/>
+              <a:t> </a:t>
+            </a:r>
+            <a:r>
+              <a:rPr lang="es-ES" dirty="0" err="1"/>
+              <a:t>boolean</a:t>
+            </a:r>
+            <a:r>
+              <a:rPr lang="es-ES" dirty="0"/>
+              <a:t> </a:t>
+            </a:r>
+            <a:r>
+              <a:rPr lang="es-ES" dirty="0" err="1"/>
+              <a:t>RetirarDineroDeLaCuentaUsuario</a:t>
+            </a:r>
+            <a:r>
+              <a:rPr lang="es-ES" dirty="0"/>
+              <a:t>(</a:t>
+            </a:r>
+            <a:r>
+              <a:rPr lang="es-ES" dirty="0" err="1"/>
+              <a:t>UsuarioImpl</a:t>
+            </a:r>
+            <a:r>
+              <a:rPr lang="es-ES" dirty="0"/>
+              <a:t> usuario, </a:t>
+            </a:r>
+            <a:r>
+              <a:rPr lang="es-ES" dirty="0" err="1"/>
+              <a:t>IngresoImpl</a:t>
+            </a:r>
+            <a:r>
+              <a:rPr lang="es-ES" dirty="0"/>
+              <a:t> ingreso</a:t>
+            </a:r>
+            <a:r>
+              <a:rPr lang="es-ES" dirty="0" smtClean="0"/>
+              <a:t>)</a:t>
+            </a:r>
+          </a:p>
+          <a:p>
+            <a:pPr marL="0" indent="0">
+              <a:buNone/>
+            </a:pPr>
+            <a:r>
+              <a:rPr lang="es-ES" dirty="0"/>
+              <a:t>Ver movimientos de la cuenta incluyendo apuestas realizadas y apuestas </a:t>
+            </a:r>
+            <a:r>
+              <a:rPr lang="es-ES" dirty="0" smtClean="0"/>
+              <a:t>ganadas:</a:t>
+            </a:r>
+            <a:endParaRPr lang="es-ES" dirty="0"/>
+          </a:p>
+          <a:p>
+            <a:r>
+              <a:rPr lang="es-ES" dirty="0" err="1"/>
+              <a:t>public</a:t>
+            </a:r>
+            <a:r>
+              <a:rPr lang="es-ES" dirty="0"/>
+              <a:t> </a:t>
+            </a:r>
+            <a:r>
+              <a:rPr lang="es-ES" dirty="0" err="1"/>
+              <a:t>void</a:t>
+            </a:r>
+            <a:r>
+              <a:rPr lang="es-ES" dirty="0"/>
+              <a:t> </a:t>
+            </a:r>
+            <a:r>
+              <a:rPr lang="es-ES" dirty="0" err="1"/>
+              <a:t>VerMovimientosCuentaUsuario</a:t>
+            </a:r>
+            <a:r>
+              <a:rPr lang="es-ES" dirty="0"/>
+              <a:t>(</a:t>
+            </a:r>
+            <a:r>
+              <a:rPr lang="es-ES" dirty="0" err="1"/>
+              <a:t>int</a:t>
+            </a:r>
+            <a:r>
+              <a:rPr lang="es-ES" dirty="0"/>
+              <a:t> </a:t>
+            </a:r>
+            <a:r>
+              <a:rPr lang="es-ES" dirty="0" err="1"/>
+              <a:t>idUsuario</a:t>
+            </a:r>
+            <a:r>
+              <a:rPr lang="es-ES" dirty="0"/>
+              <a:t>) </a:t>
+            </a:r>
+            <a:endParaRPr lang="es-ES" dirty="0" smtClean="0"/>
+          </a:p>
+          <a:p>
+            <a:pPr marL="0" indent="0">
+              <a:buNone/>
+            </a:pPr>
+            <a:r>
+              <a:rPr lang="es-ES" dirty="0"/>
+              <a:t>Crear nuevo partido:</a:t>
+            </a:r>
+          </a:p>
+          <a:p>
+            <a:r>
+              <a:rPr lang="es-ES" dirty="0" err="1"/>
+              <a:t>public</a:t>
+            </a:r>
+            <a:r>
+              <a:rPr lang="es-ES" dirty="0"/>
+              <a:t> </a:t>
+            </a:r>
+            <a:r>
+              <a:rPr lang="es-ES" dirty="0" err="1"/>
+              <a:t>boolean</a:t>
+            </a:r>
+            <a:r>
+              <a:rPr lang="es-ES" dirty="0"/>
+              <a:t> </a:t>
+            </a:r>
+            <a:r>
+              <a:rPr lang="es-ES" dirty="0" err="1"/>
+              <a:t>insertarPartido</a:t>
+            </a:r>
+            <a:r>
+              <a:rPr lang="es-ES" dirty="0"/>
+              <a:t>(</a:t>
+            </a:r>
+            <a:r>
+              <a:rPr lang="es-ES" dirty="0" err="1"/>
+              <a:t>PartidoImpl</a:t>
+            </a:r>
+            <a:r>
+              <a:rPr lang="es-ES" dirty="0"/>
+              <a:t> </a:t>
+            </a:r>
+            <a:r>
+              <a:rPr lang="es-ES" dirty="0" err="1"/>
+              <a:t>partidoNuevo</a:t>
+            </a:r>
+            <a:r>
+              <a:rPr lang="es-ES" dirty="0"/>
+              <a:t>)</a:t>
+            </a:r>
+          </a:p>
+          <a:p>
+            <a:pPr marL="0" indent="0">
+              <a:buNone/>
+            </a:pPr>
+            <a:r>
+              <a:rPr lang="es-ES" dirty="0"/>
+              <a:t>Abrir un partido para que acepte </a:t>
+            </a:r>
+            <a:r>
+              <a:rPr lang="es-ES" dirty="0" smtClean="0"/>
+              <a:t>apuestas/ </a:t>
+            </a:r>
+            <a:r>
+              <a:rPr lang="es-ES" dirty="0"/>
+              <a:t>Cerrar un partido para que no se pueda </a:t>
+            </a:r>
+            <a:r>
+              <a:rPr lang="es-ES" dirty="0" smtClean="0"/>
+              <a:t>apostar:</a:t>
+            </a:r>
+          </a:p>
+          <a:p>
+            <a:r>
+              <a:rPr lang="es-ES" dirty="0" err="1"/>
+              <a:t>public</a:t>
+            </a:r>
+            <a:r>
+              <a:rPr lang="es-ES" dirty="0"/>
+              <a:t> </a:t>
+            </a:r>
+            <a:r>
+              <a:rPr lang="es-ES" dirty="0" err="1"/>
+              <a:t>boolean</a:t>
+            </a:r>
+            <a:r>
+              <a:rPr lang="es-ES" dirty="0"/>
+              <a:t> </a:t>
+            </a:r>
+            <a:r>
+              <a:rPr lang="es-ES" dirty="0" err="1"/>
+              <a:t>modificarAperturaPeriodoApuestasDePartido</a:t>
+            </a:r>
+            <a:r>
+              <a:rPr lang="es-ES" dirty="0"/>
+              <a:t>(</a:t>
+            </a:r>
+            <a:r>
+              <a:rPr lang="es-ES" dirty="0" err="1"/>
+              <a:t>PartidoImpl</a:t>
+            </a:r>
+            <a:r>
+              <a:rPr lang="es-ES" dirty="0"/>
+              <a:t> partido, </a:t>
+            </a:r>
+            <a:r>
+              <a:rPr lang="es-ES" dirty="0" err="1"/>
+              <a:t>boolean</a:t>
+            </a:r>
+            <a:r>
+              <a:rPr lang="es-ES" dirty="0"/>
+              <a:t> </a:t>
+            </a:r>
+            <a:r>
+              <a:rPr lang="es-ES" dirty="0" err="1"/>
+              <a:t>isAbierto</a:t>
+            </a:r>
+            <a:r>
+              <a:rPr lang="es-ES" dirty="0" smtClean="0"/>
+              <a:t>)</a:t>
+            </a:r>
+            <a:endParaRPr lang="es-ES" dirty="0" smtClean="0"/>
+          </a:p>
+          <a:p>
+            <a:endParaRPr lang="es-ES" dirty="0"/>
+          </a:p>
+        </p:txBody>
+      </p:sp>
+    </p:spTree>
+    <p:extLst>
+      <p:ext uri="{BB962C8B-B14F-4D97-AF65-F5344CB8AC3E}">
+        <p14:creationId xmlns:p14="http://schemas.microsoft.com/office/powerpoint/2010/main" val="2468651229"/>
+      </p:ext>
+    </p:extLst>
+  </p:cSld>
+  <p:clrMapOvr>
+    <a:masterClrMapping/>
+  </p:clrMapOvr>
+</p:sld>
+</file>
+
+<file path=ppt/slides/slide7.xml><?xml version="1.0" encoding="utf-8"?>
+<p:sld xmlns:a="http://schemas.openxmlformats.org/drawingml/2006/main" xmlns:r="http://schemas.openxmlformats.org/officeDocument/2006/relationships" xmlns:p="http://schemas.openxmlformats.org/presentationml/2006/main">
+  <p:cSld>
+    <p:spTree>
+      <p:nvGrpSpPr>
+        <p:cNvPr id="1" name=""/>
+        <p:cNvGrpSpPr/>
+        <p:nvPr/>
+      </p:nvGrpSpPr>
+      <p:grpSpPr>
+        <a:xfrm>
+          <a:off x="0" y="0"/>
+          <a:ext cx="0" cy="0"/>
+          <a:chOff x="0" y="0"/>
+          <a:chExt cx="0" cy="0"/>
+        </a:xfrm>
+      </p:grpSpPr>
+      <p:sp>
+        <p:nvSpPr>
+          <p:cNvPr id="2" name="Título 1"/>
+          <p:cNvSpPr>
+            <a:spLocks noGrp="1"/>
+          </p:cNvSpPr>
+          <p:nvPr>
+            <p:ph type="title"/>
+          </p:nvPr>
+        </p:nvSpPr>
+        <p:spPr/>
+        <p:txBody>
+          <a:bodyPr/>
+          <a:lstStyle/>
+          <a:p>
+            <a:r>
+              <a:rPr lang="es-ES" dirty="0" smtClean="0"/>
+              <a:t>Métodos significativos</a:t>
+            </a:r>
+            <a:endParaRPr lang="es-ES" dirty="0"/>
+          </a:p>
+        </p:txBody>
+      </p:sp>
+      <p:sp>
+        <p:nvSpPr>
+          <p:cNvPr id="3" name="Marcador de contenido 2"/>
+          <p:cNvSpPr>
+            <a:spLocks noGrp="1"/>
+          </p:cNvSpPr>
+          <p:nvPr>
+            <p:ph idx="1"/>
+          </p:nvPr>
+        </p:nvSpPr>
+        <p:spPr>
+          <a:xfrm>
+            <a:off x="1251678" y="2303253"/>
+            <a:ext cx="10178322" cy="3985404"/>
+          </a:xfrm>
+        </p:spPr>
+        <p:txBody>
+          <a:bodyPr>
+            <a:normAutofit/>
+          </a:bodyPr>
+          <a:lstStyle/>
+          <a:p>
+            <a:pPr marL="0" indent="0">
+              <a:buNone/>
+            </a:pPr>
+            <a:r>
+              <a:rPr lang="es-ES" dirty="0"/>
+              <a:t>Consultar las apuestas de un partido, indicando la cantidad de dinero apostado a cada posible </a:t>
+            </a:r>
+            <a:r>
+              <a:rPr lang="es-ES" dirty="0" smtClean="0"/>
+              <a:t>resultado:</a:t>
+            </a:r>
+          </a:p>
+          <a:p>
+            <a:r>
+              <a:rPr lang="es-ES" dirty="0" err="1"/>
+              <a:t>public</a:t>
+            </a:r>
+            <a:r>
+              <a:rPr lang="es-ES" dirty="0"/>
+              <a:t> </a:t>
+            </a:r>
+            <a:r>
+              <a:rPr lang="es-ES" dirty="0" err="1"/>
+              <a:t>void</a:t>
+            </a:r>
+            <a:r>
+              <a:rPr lang="es-ES" dirty="0"/>
+              <a:t> </a:t>
+            </a:r>
+            <a:r>
+              <a:rPr lang="es-ES" dirty="0" err="1"/>
+              <a:t>DineroApostadoPorUnPosibleResultadoDeUnPartido</a:t>
+            </a:r>
+            <a:r>
+              <a:rPr lang="es-ES" dirty="0"/>
+              <a:t>(</a:t>
+            </a:r>
+            <a:r>
+              <a:rPr lang="es-ES" dirty="0" err="1"/>
+              <a:t>int</a:t>
+            </a:r>
+            <a:r>
+              <a:rPr lang="es-ES" dirty="0"/>
+              <a:t> </a:t>
+            </a:r>
+            <a:r>
+              <a:rPr lang="es-ES" dirty="0" err="1"/>
+              <a:t>idPartido</a:t>
+            </a:r>
+            <a:r>
+              <a:rPr lang="es-ES" dirty="0"/>
+              <a:t>)</a:t>
+            </a:r>
+          </a:p>
+          <a:p>
+            <a:pPr marL="0" indent="0">
+              <a:buNone/>
+            </a:pPr>
+            <a:endParaRPr lang="es-ES" u="sng" dirty="0"/>
+          </a:p>
+          <a:p>
+            <a:pPr marL="0" indent="0">
+              <a:buNone/>
+            </a:pPr>
+            <a:r>
+              <a:rPr lang="es-ES" dirty="0" smtClean="0"/>
+              <a:t>Crear </a:t>
+            </a:r>
+            <a:r>
+              <a:rPr lang="es-ES" dirty="0"/>
+              <a:t>nuevo usuario:</a:t>
+            </a:r>
+          </a:p>
+          <a:p>
+            <a:r>
+              <a:rPr lang="es-ES" dirty="0" err="1"/>
+              <a:t>public</a:t>
+            </a:r>
+            <a:r>
+              <a:rPr lang="es-ES" dirty="0"/>
+              <a:t> </a:t>
+            </a:r>
+            <a:r>
+              <a:rPr lang="es-ES" dirty="0" err="1"/>
+              <a:t>boolean</a:t>
+            </a:r>
+            <a:r>
+              <a:rPr lang="es-ES" dirty="0"/>
+              <a:t> </a:t>
+            </a:r>
+            <a:r>
+              <a:rPr lang="es-ES" dirty="0" err="1"/>
+              <a:t>insertarUsuario</a:t>
+            </a:r>
+            <a:r>
+              <a:rPr lang="es-ES" dirty="0"/>
+              <a:t>(</a:t>
+            </a:r>
+            <a:r>
+              <a:rPr lang="es-ES" dirty="0" err="1"/>
+              <a:t>UsuarioImpl</a:t>
+            </a:r>
+            <a:r>
+              <a:rPr lang="es-ES" dirty="0"/>
+              <a:t> </a:t>
+            </a:r>
+            <a:r>
+              <a:rPr lang="es-ES" dirty="0" err="1"/>
+              <a:t>nuevoUsuario</a:t>
+            </a:r>
+            <a:r>
+              <a:rPr lang="es-ES" dirty="0"/>
+              <a:t>)</a:t>
+            </a:r>
+          </a:p>
+          <a:p>
+            <a:endParaRPr lang="es-ES" dirty="0"/>
+          </a:p>
+          <a:p>
+            <a:endParaRPr lang="es-ES" dirty="0" smtClean="0"/>
+          </a:p>
+          <a:p>
+            <a:endParaRPr lang="es-ES" dirty="0"/>
+          </a:p>
+        </p:txBody>
+      </p:sp>
+    </p:spTree>
+    <p:extLst>
+      <p:ext uri="{BB962C8B-B14F-4D97-AF65-F5344CB8AC3E}">
+        <p14:creationId xmlns:p14="http://schemas.microsoft.com/office/powerpoint/2010/main" val="2860041084"/>
+      </p:ext>
+    </p:extLst>
+  </p:cSld>
+  <p:clrMapOvr>
+    <a:masterClrMapping/>
+  </p:clrMapOvr>
+</p:sld>
+</file>
+
+<file path=ppt/slides/slide8.xml><?xml version="1.0" encoding="utf-8"?>
+<p:sld xmlns:a="http://schemas.openxmlformats.org/drawingml/2006/main" xmlns:r="http://schemas.openxmlformats.org/officeDocument/2006/relationships" xmlns:p="http://schemas.openxmlformats.org/presentationml/2006/main">
+  <p:cSld>
+    <p:spTree>
+      <p:nvGrpSpPr>
+        <p:cNvPr id="1" name=""/>
+        <p:cNvGrpSpPr/>
+        <p:nvPr/>
+      </p:nvGrpSpPr>
+      <p:grpSpPr>
+        <a:xfrm>
+          <a:off x="0" y="0"/>
+          <a:ext cx="0" cy="0"/>
+          <a:chOff x="0" y="0"/>
+          <a:chExt cx="0" cy="0"/>
+        </a:xfrm>
+      </p:grpSpPr>
+      <p:sp>
+        <p:nvSpPr>
+          <p:cNvPr id="2" name="Título 1"/>
+          <p:cNvSpPr>
+            <a:spLocks noGrp="1"/>
+          </p:cNvSpPr>
+          <p:nvPr>
+            <p:ph type="title"/>
+          </p:nvPr>
+        </p:nvSpPr>
+        <p:spPr/>
+        <p:txBody>
+          <a:bodyPr/>
+          <a:lstStyle/>
+          <a:p>
+            <a:r>
+              <a:rPr lang="es-ES" dirty="0" smtClean="0"/>
               <a:t>Dificultades</a:t>
             </a:r>
             <a:endParaRPr lang="es-ES" dirty="0"/>
@@ -7575,7 +8152,7 @@
 </p:sld>
 </file>
 
-<file path=ppt/slides/slide7.xml><?xml version="1.0" encoding="utf-8"?>
+<file path=ppt/slides/slide9.xml><?xml version="1.0" encoding="utf-8"?>
 <p:sld xmlns:a="http://schemas.openxmlformats.org/drawingml/2006/main" xmlns:r="http://schemas.openxmlformats.org/officeDocument/2006/relationships" xmlns:p="http://schemas.openxmlformats.org/presentationml/2006/main">
   <p:cSld>
     <p:spTree>

</xml_diff>